<commit_message>
Team Meetings: Fixing typos in slides.
</commit_message>
<xml_diff>
--- a/meetings/Exiv2-v0.24.1.pptx
+++ b/meetings/Exiv2-v0.24.1.pptx
@@ -6757,7 +6757,7 @@
           <a:p>
             <a:r>
               <a:rPr lang="en-US" dirty="0" smtClean="0"/>
-              <a:t>Objectives</a:t>
+              <a:t>Meeting Objective</a:t>
             </a:r>
             <a:endParaRPr lang="en-US" dirty="0"/>
           </a:p>
@@ -6805,12 +6805,17 @@
           <a:p>
             <a:r>
               <a:rPr lang="en-US" dirty="0" smtClean="0"/>
-              <a:t>No other meeting </a:t>
-            </a:r>
-            <a:r>
-              <a:rPr lang="en-US" dirty="0" smtClean="0"/>
-              <a:t>goal</a:t>
-            </a:r>
+              <a:t>*** No </a:t>
+            </a:r>
+            <a:r>
+              <a:rPr lang="en-US" dirty="0" smtClean="0"/>
+              <a:t>other meeting </a:t>
+            </a:r>
+            <a:r>
+              <a:rPr lang="en-US" dirty="0" smtClean="0"/>
+              <a:t>objective ***</a:t>
+            </a:r>
+            <a:endParaRPr lang="en-US" dirty="0" smtClean="0"/>
           </a:p>
           <a:p>
             <a:r>
@@ -7908,7 +7913,19 @@
             </a:br>
             <a:r>
               <a:rPr lang="en-US" dirty="0" smtClean="0"/>
-              <a:t>4	Team Member Team Members</a:t>
+              <a:t>4	</a:t>
+            </a:r>
+            <a:r>
+              <a:rPr lang="en-US" dirty="0" smtClean="0"/>
+              <a:t>Assignments to </a:t>
+            </a:r>
+            <a:r>
+              <a:rPr lang="en-US" dirty="0" smtClean="0"/>
+              <a:t>Team </a:t>
+            </a:r>
+            <a:r>
+              <a:rPr lang="en-US" dirty="0" smtClean="0"/>
+              <a:t>Members</a:t>
             </a:r>
             <a:r>
               <a:rPr lang="en-US" dirty="0"/>
@@ -9021,12 +9038,12 @@
               <a:t>More platforms supported (</a:t>
             </a:r>
             <a:r>
-              <a:rPr lang="en-US" dirty="0" err="1" smtClean="0"/>
-              <a:t>Andoid</a:t>
-            </a:r>
-            <a:r>
-              <a:rPr lang="en-US" dirty="0" smtClean="0"/>
-              <a:t> and </a:t>
+              <a:rPr lang="en-US" dirty="0" smtClean="0"/>
+              <a:t>Android </a:t>
+            </a:r>
+            <a:r>
+              <a:rPr lang="en-US" dirty="0" smtClean="0"/>
+              <a:t>and </a:t>
             </a:r>
             <a:r>
               <a:rPr lang="en-US" dirty="0" err="1" smtClean="0"/>

</xml_diff>

<commit_message>
Team Meetings:  Fixing more typos.
</commit_message>
<xml_diff>
--- a/meetings/Exiv2-v0.24.1.pptx
+++ b/meetings/Exiv2-v0.24.1.pptx
@@ -874,7 +874,7 @@
           <a:p>
             <a:fld id="{50684158-AEF9-F541-B7F7-457AA9371B9F}" type="datetime8">
               <a:rPr lang="en-GB" smtClean="0"/>
-              <a:t>22-Apr-2015 10:56</a:t>
+              <a:t>22-Apr-2015 12:47</a:t>
             </a:fld>
             <a:endParaRPr lang="en-US"/>
           </a:p>
@@ -969,7 +969,7 @@
           <a:p>
             <a:fld id="{D4610EBB-D907-9449-8FEA-ED325EF61155}" type="datetime8">
               <a:rPr lang="en-GB" smtClean="0"/>
-              <a:t>22-Apr-2015 10:56</a:t>
+              <a:t>22-Apr-2015 12:47</a:t>
             </a:fld>
             <a:endParaRPr lang="en-US"/>
           </a:p>
@@ -1276,7 +1276,7 @@
           <a:p>
             <a:fld id="{453BA56C-E552-7340-BC54-08A9EBD5FC05}" type="datetime8">
               <a:rPr lang="en-GB" smtClean="0"/>
-              <a:t>22-Apr-2015 10:56</a:t>
+              <a:t>22-Apr-2015 12:47</a:t>
             </a:fld>
             <a:endParaRPr lang="en-US"/>
           </a:p>
@@ -1501,7 +1501,7 @@
           <a:p>
             <a:fld id="{4664B96B-42AD-F043-9EFC-F851190D4880}" type="datetime8">
               <a:rPr lang="en-GB" smtClean="0"/>
-              <a:t>22-Apr-2015 10:56</a:t>
+              <a:t>22-Apr-2015 12:47</a:t>
             </a:fld>
             <a:endParaRPr lang="en-US"/>
           </a:p>
@@ -1893,7 +1893,7 @@
           <a:p>
             <a:fld id="{8C4F81CC-6030-0D41-BD2B-2D55CBDB487B}" type="datetime8">
               <a:rPr lang="en-GB" smtClean="0"/>
-              <a:t>22-Apr-2015 10:56</a:t>
+              <a:t>22-Apr-2015 12:47</a:t>
             </a:fld>
             <a:endParaRPr lang="en-US"/>
           </a:p>
@@ -2205,7 +2205,7 @@
           <a:p>
             <a:fld id="{62099B12-AD97-F440-892A-1F99F7E663F8}" type="datetime8">
               <a:rPr lang="en-GB" smtClean="0"/>
-              <a:t>22-Apr-2015 10:56</a:t>
+              <a:t>22-Apr-2015 12:47</a:t>
             </a:fld>
             <a:endParaRPr lang="en-US"/>
           </a:p>
@@ -2407,7 +2407,7 @@
           <a:p>
             <a:fld id="{D2D478E8-B690-5B4A-8E03-205B27722A3E}" type="datetime8">
               <a:rPr lang="en-GB" smtClean="0"/>
-              <a:t>22-Apr-2015 10:56</a:t>
+              <a:t>22-Apr-2015 12:47</a:t>
             </a:fld>
             <a:endParaRPr lang="en-US"/>
           </a:p>
@@ -2614,7 +2614,7 @@
           <a:p>
             <a:fld id="{AD301DA1-92EC-4F4E-BF75-5D6EF2BECBCB}" type="datetime8">
               <a:rPr lang="en-GB" smtClean="0"/>
-              <a:t>22-Apr-2015 10:56</a:t>
+              <a:t>22-Apr-2015 12:47</a:t>
             </a:fld>
             <a:endParaRPr lang="en-US"/>
           </a:p>
@@ -2811,7 +2811,7 @@
           <a:p>
             <a:fld id="{C66E1988-3043-8F43-92FE-A5FA8C8F7BB7}" type="datetime8">
               <a:rPr lang="en-GB" smtClean="0"/>
-              <a:t>22-Apr-2015 10:56</a:t>
+              <a:t>22-Apr-2015 12:47</a:t>
             </a:fld>
             <a:endParaRPr lang="en-US"/>
           </a:p>
@@ -3087,7 +3087,7 @@
           <a:p>
             <a:fld id="{D29759E7-790C-D747-8166-EE5474C1982E}" type="datetime8">
               <a:rPr lang="en-GB" smtClean="0"/>
-              <a:t>22-Apr-2015 10:56</a:t>
+              <a:t>22-Apr-2015 12:47</a:t>
             </a:fld>
             <a:endParaRPr lang="en-US"/>
           </a:p>
@@ -3402,7 +3402,7 @@
           <a:p>
             <a:fld id="{FD7D5E06-F004-B741-A968-950EA387287B}" type="datetime8">
               <a:rPr lang="en-GB" smtClean="0"/>
-              <a:t>22-Apr-2015 10:56</a:t>
+              <a:t>22-Apr-2015 12:47</a:t>
             </a:fld>
             <a:endParaRPr lang="en-US"/>
           </a:p>
@@ -3872,7 +3872,7 @@
           <a:p>
             <a:fld id="{284F2FE9-C7F0-744B-94B3-7FB6C0C7A7AC}" type="datetime8">
               <a:rPr lang="en-GB" smtClean="0"/>
-              <a:t>22-Apr-2015 10:56</a:t>
+              <a:t>22-Apr-2015 12:47</a:t>
             </a:fld>
             <a:endParaRPr lang="en-US"/>
           </a:p>
@@ -4240,7 +4240,7 @@
           <a:p>
             <a:fld id="{84AE1E6E-75DA-F74A-9CB0-4A08E364BCC5}" type="datetime8">
               <a:rPr lang="en-GB" smtClean="0"/>
-              <a:t>22-Apr-2015 10:56</a:t>
+              <a:t>22-Apr-2015 12:47</a:t>
             </a:fld>
             <a:endParaRPr lang="en-US"/>
           </a:p>
@@ -4555,7 +4555,7 @@
           <a:p>
             <a:fld id="{470A43BE-DCB4-E441-84BC-9206BE09A6E9}" type="datetime8">
               <a:rPr lang="en-GB" smtClean="0"/>
-              <a:t>22-Apr-2015 10:56</a:t>
+              <a:t>22-Apr-2015 12:47</a:t>
             </a:fld>
             <a:endParaRPr lang="en-US"/>
           </a:p>
@@ -4870,7 +4870,7 @@
           <a:p>
             <a:fld id="{26B4B2EE-C089-0344-9BCB-E686BC5B579B}" type="datetime8">
               <a:rPr lang="en-GB" smtClean="0"/>
-              <a:t>22-Apr-2015 10:56</a:t>
+              <a:t>22-Apr-2015 12:47</a:t>
             </a:fld>
             <a:endParaRPr lang="en-US"/>
           </a:p>
@@ -5359,7 +5359,7 @@
           <a:p>
             <a:fld id="{13992AC6-5E03-F449-829F-139F3F0797E9}" type="datetime8">
               <a:rPr lang="en-GB" smtClean="0"/>
-              <a:t>22-Apr-2015 10:56</a:t>
+              <a:t>22-Apr-2015 12:47</a:t>
             </a:fld>
             <a:endParaRPr lang="en-US"/>
           </a:p>
@@ -5626,7 +5626,7 @@
           <a:p>
             <a:fld id="{F9F5659A-14A4-684C-8DFF-B535F8211020}" type="datetime8">
               <a:rPr lang="en-GB" smtClean="0"/>
-              <a:t>22-Apr-2015 10:56</a:t>
+              <a:t>22-Apr-2015 12:47</a:t>
             </a:fld>
             <a:endParaRPr lang="en-US"/>
           </a:p>
@@ -6042,19 +6042,7 @@
           <a:p>
             <a:r>
               <a:rPr lang="en-US" dirty="0" smtClean="0"/>
-              <a:t>KDE</a:t>
-            </a:r>
-            <a:r>
-              <a:rPr lang="en-US" dirty="0" smtClean="0"/>
-              <a:t> </a:t>
-            </a:r>
-            <a:r>
-              <a:rPr lang="en-US" dirty="0" smtClean="0"/>
-              <a:t>Security </a:t>
-            </a:r>
-            <a:r>
-              <a:rPr lang="en-US" dirty="0" smtClean="0"/>
-              <a:t>Issue</a:t>
+              <a:t>KDE Security Issue</a:t>
             </a:r>
             <a:endParaRPr lang="en-US" dirty="0"/>
           </a:p>
@@ -6082,7 +6070,7 @@
         </p:blipFill>
         <p:spPr>
           <a:xfrm>
-            <a:off x="6734049" y="420061"/>
+            <a:off x="327957" y="420061"/>
             <a:ext cx="2032000" cy="1231900"/>
           </a:xfrm>
           <a:prstGeom prst="rect">
@@ -6162,15 +6150,7 @@
           <a:p>
             <a:r>
               <a:rPr lang="en-US" dirty="0" smtClean="0"/>
-              <a:t>Exiv2 is a great open source</a:t>
-            </a:r>
-            <a:r>
-              <a:rPr lang="en-US" dirty="0" smtClean="0"/>
-              <a:t> </a:t>
-            </a:r>
-            <a:r>
-              <a:rPr lang="en-US" dirty="0" smtClean="0"/>
-              <a:t>project</a:t>
+              <a:t>Exiv2 is a great open source project</a:t>
             </a:r>
             <a:br>
               <a:rPr lang="en-US" dirty="0" smtClean="0"/>
@@ -6190,49 +6170,21 @@
           <a:p>
             <a:r>
               <a:rPr lang="en-US" dirty="0" smtClean="0"/>
-              <a:t>Most </a:t>
-            </a:r>
-            <a:r>
-              <a:rPr lang="en-US" dirty="0" smtClean="0"/>
-              <a:t>C++ code and test harness is </a:t>
-            </a:r>
-            <a:r>
-              <a:rPr lang="en-US" dirty="0" smtClean="0"/>
-              <a:t>excellent </a:t>
-            </a:r>
-            <a:r>
-              <a:rPr lang="en-US" dirty="0" smtClean="0"/>
-              <a:t>thanks to:</a:t>
-            </a:r>
-            <a:r>
-              <a:rPr lang="en-US" dirty="0" smtClean="0"/>
-              <a:t/>
+              <a:t>Most C++ code and test harness is excellent thanks to:</a:t>
             </a:r>
             <a:br>
               <a:rPr lang="en-US" dirty="0" smtClean="0"/>
             </a:br>
             <a:r>
               <a:rPr lang="en-US" dirty="0" smtClean="0"/>
-              <a:t>-	</a:t>
-            </a:r>
-            <a:r>
-              <a:rPr lang="en-US" dirty="0" smtClean="0"/>
-              <a:t>Andreas		Brad</a:t>
-            </a:r>
-            <a:r>
-              <a:rPr lang="en-US" dirty="0" smtClean="0"/>
-              <a:t/>
+              <a:t>-	Andreas		Brad</a:t>
             </a:r>
             <a:br>
               <a:rPr lang="en-US" dirty="0" smtClean="0"/>
             </a:br>
             <a:r>
               <a:rPr lang="en-US" dirty="0" smtClean="0"/>
-              <a:t>-	</a:t>
-            </a:r>
-            <a:r>
-              <a:rPr lang="en-US" dirty="0" smtClean="0"/>
-              <a:t>Gilles		Volker</a:t>
+              <a:t>-	Gilles		Volker</a:t>
             </a:r>
           </a:p>
           <a:p>
@@ -6255,7 +6207,6 @@
               <a:rPr lang="en-US" dirty="0" smtClean="0"/>
               <a:t>		Thomas B (v0.26)</a:t>
             </a:r>
-            <a:endParaRPr lang="en-US" dirty="0" smtClean="0"/>
           </a:p>
           <a:p>
             <a:r>
@@ -6267,13 +6218,8 @@
             </a:br>
             <a:r>
               <a:rPr lang="en-US" dirty="0" smtClean="0"/>
-              <a:t>-	</a:t>
-            </a:r>
-            <a:r>
-              <a:rPr lang="en-US" dirty="0" smtClean="0"/>
-              <a:t>Robin		Alan</a:t>
-            </a:r>
-            <a:endParaRPr lang="en-US" dirty="0" smtClean="0"/>
+              <a:t>-	Robin		Alan</a:t>
+            </a:r>
           </a:p>
           <a:p>
             <a:r>
@@ -6338,7 +6284,7 @@
           <a:p>
             <a:fld id="{A24E8C0C-F230-ED46-AB54-3A6B4B9814E6}" type="datetime8">
               <a:rPr lang="en-GB" smtClean="0"/>
-              <a:t>22-Apr-2015 10:56</a:t>
+              <a:t>22-Apr-2015 12:47</a:t>
             </a:fld>
             <a:endParaRPr lang="en-US"/>
           </a:p>
@@ -6488,11 +6434,7 @@
           <a:p>
             <a:r>
               <a:rPr lang="en-US" dirty="0" smtClean="0"/>
-              <a:t>v0.25 code complete December </a:t>
-            </a:r>
-            <a:r>
-              <a:rPr lang="en-US" dirty="0" smtClean="0"/>
-              <a:t>2014</a:t>
+              <a:t>v0.25 code complete December 2014</a:t>
             </a:r>
             <a:br>
               <a:rPr lang="en-US" dirty="0" smtClean="0"/>
@@ -6508,24 +6450,12 @@
               <a:rPr lang="en-US" dirty="0" smtClean="0"/>
               <a:t>Many maker-note updates</a:t>
             </a:r>
-            <a:r>
-              <a:rPr lang="en-US" dirty="0" smtClean="0"/>
-              <a:t/>
-            </a:r>
             <a:br>
               <a:rPr lang="en-US" dirty="0" smtClean="0"/>
             </a:br>
             <a:r>
               <a:rPr lang="en-US" dirty="0" smtClean="0"/>
-              <a:t>Option to build </a:t>
-            </a:r>
-            <a:r>
-              <a:rPr lang="en-US" dirty="0" smtClean="0"/>
-              <a:t>GSoC2013 cloud ready code (</a:t>
-            </a:r>
-            <a:r>
-              <a:rPr lang="en-US" dirty="0" smtClean="0"/>
-              <a:t>http </a:t>
+              <a:t>Option to build GSoC2013 cloud ready code (http </a:t>
             </a:r>
             <a:r>
               <a:rPr lang="en-US" dirty="0" err="1" smtClean="0"/>
@@ -6535,10 +6465,6 @@
               <a:rPr lang="en-US" dirty="0" smtClean="0"/>
               <a:t>)</a:t>
             </a:r>
-            <a:r>
-              <a:rPr lang="en-US" dirty="0" smtClean="0"/>
-              <a:t/>
-            </a:r>
             <a:br>
               <a:rPr lang="en-US" dirty="0" smtClean="0"/>
             </a:br>
@@ -6599,10 +6525,6 @@
             <a:r>
               <a:rPr lang="en-US" dirty="0" smtClean="0"/>
               <a:t>Accessory ‘overflow’ file</a:t>
-            </a:r>
-            <a:r>
-              <a:rPr lang="en-US" dirty="0" smtClean="0"/>
-              <a:t/>
             </a:r>
             <a:br>
               <a:rPr lang="en-US" dirty="0" smtClean="0"/>
@@ -6658,7 +6580,7 @@
           <a:p>
             <a:fld id="{E6B5324F-4486-2849-B445-126A99F33717}" type="datetime8">
               <a:rPr lang="en-GB" smtClean="0"/>
-              <a:t>22-Apr-2015 10:56</a:t>
+              <a:t>22-Apr-2015 12:47</a:t>
             </a:fld>
             <a:endParaRPr lang="en-US"/>
           </a:p>
@@ -6782,47 +6704,20 @@
           <a:p>
             <a:r>
               <a:rPr lang="en-US" dirty="0" smtClean="0"/>
-              <a:t>To </a:t>
-            </a:r>
-            <a:r>
-              <a:rPr lang="en-US" dirty="0" smtClean="0"/>
-              <a:t>decide how to </a:t>
-            </a:r>
-            <a:r>
-              <a:rPr lang="en-US" dirty="0" smtClean="0"/>
-              <a:t>address </a:t>
-            </a:r>
-            <a:r>
-              <a:rPr lang="en-US" dirty="0" smtClean="0"/>
-              <a:t>KDE’s Security </a:t>
-            </a:r>
-            <a:r>
-              <a:rPr lang="en-US" dirty="0" smtClean="0"/>
-              <a:t>Issue</a:t>
-            </a:r>
-            <a:endParaRPr lang="en-US" dirty="0" smtClean="0"/>
-          </a:p>
-          <a:p>
-            <a:r>
-              <a:rPr lang="en-US" dirty="0" smtClean="0"/>
-              <a:t>*** No </a:t>
-            </a:r>
-            <a:r>
-              <a:rPr lang="en-US" dirty="0" smtClean="0"/>
-              <a:t>other meeting </a:t>
-            </a:r>
-            <a:r>
-              <a:rPr lang="en-US" dirty="0" smtClean="0"/>
-              <a:t>objective ***</a:t>
-            </a:r>
-            <a:endParaRPr lang="en-US" dirty="0" smtClean="0"/>
+              <a:t>To decide how to address KDE’s Security Issue</a:t>
+            </a:r>
+          </a:p>
+          <a:p>
+            <a:r>
+              <a:rPr lang="en-US" dirty="0" smtClean="0"/>
+              <a:t>*** No other meeting objective ***</a:t>
+            </a:r>
           </a:p>
           <a:p>
             <a:r>
               <a:rPr lang="en-US" dirty="0" smtClean="0"/>
               <a:t>Duration: 1 hour maximum</a:t>
             </a:r>
-            <a:endParaRPr lang="en-US" dirty="0" smtClean="0"/>
           </a:p>
           <a:p>
             <a:r>
@@ -6913,7 +6808,7 @@
           <a:p>
             <a:fld id="{12B447A4-3CD3-0243-900F-09A087B85CA8}" type="datetime8">
               <a:rPr lang="en-GB" smtClean="0"/>
-              <a:t>22-Apr-2015 10:56</a:t>
+              <a:t>22-Apr-2015 12:47</a:t>
             </a:fld>
             <a:endParaRPr lang="en-US"/>
           </a:p>
@@ -7022,10 +6917,6 @@
               <a:rPr lang="en-US" dirty="0" smtClean="0"/>
               <a:t>	</a:t>
             </a:r>
-            <a:r>
-              <a:rPr lang="en-US" dirty="0" smtClean="0"/>
-              <a:t/>
-            </a:r>
             <a:br>
               <a:rPr lang="en-US" dirty="0" smtClean="0"/>
             </a:br>
@@ -7372,11 +7263,7 @@
             </a:r>
             <a:r>
               <a:rPr lang="en-US" sz="1200" dirty="0" smtClean="0"/>
-              <a:t>           </a:t>
-            </a:r>
-            <a:r>
-              <a:rPr lang="en-US" sz="1200" dirty="0" smtClean="0"/>
-              <a:t>	</a:t>
+              <a:t>           	</a:t>
             </a:r>
             <a:r>
               <a:rPr lang="en-US" sz="1200" dirty="0" err="1" smtClean="0"/>
@@ -7757,7 +7644,7 @@
           <a:p>
             <a:fld id="{12824A3B-A608-3947-81FA-B42F5DA9341C}" type="datetime8">
               <a:rPr lang="en-GB" smtClean="0"/>
-              <a:t>22-Apr-2015 10:56</a:t>
+              <a:t>22-Apr-2015 12:47</a:t>
             </a:fld>
             <a:endParaRPr lang="en-US"/>
           </a:p>
@@ -7913,19 +7800,7 @@
             </a:br>
             <a:r>
               <a:rPr lang="en-US" dirty="0" smtClean="0"/>
-              <a:t>4	</a:t>
-            </a:r>
-            <a:r>
-              <a:rPr lang="en-US" dirty="0" smtClean="0"/>
-              <a:t>Assignments to </a:t>
-            </a:r>
-            <a:r>
-              <a:rPr lang="en-US" dirty="0" smtClean="0"/>
-              <a:t>Team </a:t>
-            </a:r>
-            <a:r>
-              <a:rPr lang="en-US" dirty="0" smtClean="0"/>
-              <a:t>Members</a:t>
+              <a:t>4	Assignments to Team Members</a:t>
             </a:r>
             <a:r>
               <a:rPr lang="en-US" dirty="0"/>
@@ -8001,7 +7876,7 @@
           <a:p>
             <a:fld id="{5379D298-6F44-4A45-8706-E97D04C346BD}" type="datetime8">
               <a:rPr lang="en-GB" smtClean="0"/>
-              <a:t>22-Apr-2015 10:56</a:t>
+              <a:t>22-Apr-2015 12:47</a:t>
             </a:fld>
             <a:endParaRPr lang="en-US"/>
           </a:p>
@@ -8123,15 +7998,7 @@
           <a:p>
             <a:r>
               <a:rPr lang="en-US" dirty="0" smtClean="0"/>
-              <a:t>We must isolate the video code as </a:t>
-            </a:r>
-            <a:r>
-              <a:rPr lang="en-US" dirty="0" smtClean="0"/>
-              <a:t>a build option</a:t>
-            </a:r>
-            <a:r>
-              <a:rPr lang="en-US" dirty="0" smtClean="0"/>
-              <a:t/>
+              <a:t>We must isolate the video code as a build option</a:t>
             </a:r>
             <a:br>
               <a:rPr lang="en-US" dirty="0" smtClean="0"/>
@@ -8142,7 +8009,23 @@
             </a:r>
             <a:r>
               <a:rPr lang="en-US" dirty="0" smtClean="0"/>
-              <a:t>we done with </a:t>
+              <a:t>already</a:t>
+            </a:r>
+            <a:r>
+              <a:rPr lang="en-US" dirty="0" smtClean="0"/>
+              <a:t> </a:t>
+            </a:r>
+            <a:r>
+              <a:rPr lang="en-US" dirty="0" smtClean="0"/>
+              <a:t>done </a:t>
+            </a:r>
+            <a:r>
+              <a:rPr lang="en-US" dirty="0" smtClean="0"/>
+              <a:t>for</a:t>
+            </a:r>
+            <a:r>
+              <a:rPr lang="en-US" dirty="0" smtClean="0"/>
+              <a:t> </a:t>
             </a:r>
             <a:r>
               <a:rPr lang="en-US" dirty="0" err="1" smtClean="0"/>
@@ -8150,34 +8033,44 @@
             </a:r>
             <a:r>
               <a:rPr lang="en-US" dirty="0" smtClean="0"/>
-              <a:t> for v0.25)</a:t>
-            </a:r>
-          </a:p>
-          <a:p>
-            <a:r>
-              <a:rPr lang="en-US" dirty="0" smtClean="0"/>
-              <a:t>The video code requires to be “hardened” to deal with suspect files</a:t>
-            </a:r>
-          </a:p>
-          <a:p>
-            <a:r>
-              <a:rPr lang="en-US" dirty="0" smtClean="0"/>
-              <a:t>The video code requires simplification</a:t>
+              <a:t> </a:t>
+            </a:r>
+            <a:r>
+              <a:rPr lang="en-US" dirty="0" smtClean="0"/>
+              <a:t>in</a:t>
+            </a:r>
+            <a:r>
+              <a:rPr lang="en-US" dirty="0" smtClean="0"/>
+              <a:t> </a:t>
+            </a:r>
+            <a:r>
+              <a:rPr lang="en-US" dirty="0" smtClean="0"/>
+              <a:t>v0.25)</a:t>
+            </a:r>
+          </a:p>
+          <a:p>
+            <a:r>
+              <a:rPr lang="en-US" dirty="0" smtClean="0"/>
+              <a:t>The </a:t>
+            </a:r>
+            <a:r>
+              <a:rPr lang="en-US" dirty="0" smtClean="0"/>
+              <a:t>video code requires </a:t>
+            </a:r>
+            <a:r>
+              <a:rPr lang="en-US" dirty="0" smtClean="0"/>
+              <a:t>simplification:</a:t>
+            </a:r>
+            <a:r>
+              <a:rPr lang="en-US" dirty="0" smtClean="0"/>
+              <a:t/>
             </a:r>
             <a:br>
               <a:rPr lang="en-US" dirty="0" smtClean="0"/>
             </a:br>
             <a:r>
               <a:rPr lang="en-US" dirty="0" smtClean="0"/>
-              <a:t>- refactoring into </a:t>
-            </a:r>
-            <a:r>
-              <a:rPr lang="en-US" dirty="0" smtClean="0"/>
-              <a:t>functions</a:t>
-            </a:r>
-            <a:r>
-              <a:rPr lang="en-US" dirty="0" smtClean="0"/>
-              <a:t/>
+              <a:t>- refactoring into functions</a:t>
             </a:r>
             <a:br>
               <a:rPr lang="en-US" dirty="0" smtClean="0"/>
@@ -8218,13 +8111,23 @@
             </a:r>
             <a:r>
               <a:rPr lang="en-US" dirty="0" smtClean="0"/>
-              <a:t>(5Gbyte video </a:t>
-            </a:r>
-            <a:r>
-              <a:rPr lang="en-US" dirty="0" smtClean="0"/>
-              <a:t>files over http)</a:t>
-            </a:r>
-            <a:endParaRPr lang="en-US" dirty="0" smtClean="0"/>
+              <a:t>(5Gbyte video files over http</a:t>
+            </a:r>
+            <a:r>
+              <a:rPr lang="en-US" dirty="0" smtClean="0"/>
+              <a:t>)</a:t>
+            </a:r>
+          </a:p>
+          <a:p>
+            <a:r>
+              <a:rPr lang="en-US" dirty="0"/>
+              <a:t>The video code requires to be “hardened” to deal with suspect </a:t>
+            </a:r>
+            <a:r>
+              <a:rPr lang="en-US" dirty="0" smtClean="0"/>
+              <a:t>files</a:t>
+            </a:r>
+            <a:endParaRPr lang="en-US" dirty="0"/>
           </a:p>
         </p:txBody>
       </p:sp>
@@ -8275,7 +8178,7 @@
           <a:p>
             <a:fld id="{A23348B8-C2FC-BD41-B270-BEDAFEEE35DB}" type="datetime8">
               <a:rPr lang="en-GB" smtClean="0"/>
-              <a:t>22-Apr-2015 10:56</a:t>
+              <a:t>22-Apr-2015 12:49</a:t>
             </a:fld>
             <a:endParaRPr lang="en-US"/>
           </a:p>
@@ -8425,15 +8328,7 @@
             </a:br>
             <a:r>
               <a:rPr lang="en-US" dirty="0" smtClean="0"/>
-              <a:t>2) removed and </a:t>
-            </a:r>
-            <a:r>
-              <a:rPr lang="en-US" dirty="0" smtClean="0"/>
-              <a:t>reintroduced in </a:t>
-            </a:r>
-            <a:r>
-              <a:rPr lang="en-US" dirty="0" smtClean="0"/>
-              <a:t>v0.26 (or later)</a:t>
+              <a:t>2) removed and reintroduced in v0.26 (or later)</a:t>
             </a:r>
           </a:p>
           <a:p>
@@ -8467,19 +8362,7 @@
             </a:br>
             <a:r>
               <a:rPr lang="en-US" dirty="0" smtClean="0"/>
-              <a:t>Time </a:t>
-            </a:r>
-            <a:r>
-              <a:rPr lang="en-US" dirty="0" smtClean="0"/>
-              <a:t>Gue</a:t>
-            </a:r>
-            <a:r>
-              <a:rPr lang="en-US" dirty="0" smtClean="0"/>
-              <a:t>stimate</a:t>
-            </a:r>
-            <a:r>
-              <a:rPr lang="en-US" dirty="0" smtClean="0"/>
-              <a:t>:	2 weeks </a:t>
+              <a:t>Time Guestimate:	2 weeks </a:t>
             </a:r>
           </a:p>
           <a:p>
@@ -8506,15 +8389,7 @@
             </a:br>
             <a:r>
               <a:rPr lang="en-US" dirty="0" smtClean="0"/>
-              <a:t>Time Guestimate</a:t>
-            </a:r>
-            <a:r>
-              <a:rPr lang="en-US" dirty="0" smtClean="0"/>
-              <a:t>: </a:t>
-            </a:r>
-            <a:r>
-              <a:rPr lang="en-US" dirty="0" smtClean="0"/>
-              <a:t>	Unknown </a:t>
+              <a:t>Time Guestimate: 	Unknown </a:t>
             </a:r>
             <a:endParaRPr lang="en-US" dirty="0"/>
           </a:p>
@@ -8570,7 +8445,7 @@
           <a:p>
             <a:fld id="{0FE6EDA9-5A32-FE44-8CF4-C32B08FF5187}" type="datetime8">
               <a:rPr lang="en-GB" smtClean="0"/>
-              <a:t>22-Apr-2015 10:56</a:t>
+              <a:t>22-Apr-2015 12:47</a:t>
             </a:fld>
             <a:endParaRPr lang="en-US"/>
           </a:p>
@@ -8850,7 +8725,7 @@
           <a:p>
             <a:fld id="{E78FA98F-E1CA-5346-B70E-AE0F4504117E}" type="datetime8">
               <a:rPr lang="en-GB" smtClean="0"/>
-              <a:t>22-Apr-2015 10:56</a:t>
+              <a:t>22-Apr-2015 12:47</a:t>
             </a:fld>
             <a:endParaRPr lang="en-US"/>
           </a:p>
@@ -9004,11 +8879,7 @@
             </a:r>
             <a:r>
               <a:rPr lang="en-US" dirty="0" smtClean="0"/>
-              <a:t> 2015</a:t>
-            </a:r>
-            <a:r>
-              <a:rPr lang="en-US" dirty="0" smtClean="0"/>
-              <a:t>)</a:t>
+              <a:t> 2015)</a:t>
             </a:r>
           </a:p>
           <a:p>
@@ -9016,7 +8887,6 @@
               <a:rPr lang="en-US" dirty="0" smtClean="0"/>
               <a:t>Accessory ‘overflow’ file (Thomas B)</a:t>
             </a:r>
-            <a:endParaRPr lang="en-US" dirty="0" smtClean="0"/>
           </a:p>
           <a:p>
             <a:r>
@@ -9025,25 +8895,13 @@
             </a:r>
             <a:r>
               <a:rPr lang="en-US" dirty="0" smtClean="0"/>
-              <a:t>ore </a:t>
-            </a:r>
-            <a:r>
-              <a:rPr lang="en-US" dirty="0" smtClean="0"/>
-              <a:t>features and bug fixes</a:t>
-            </a:r>
-          </a:p>
-          <a:p>
-            <a:r>
-              <a:rPr lang="en-US" dirty="0" smtClean="0"/>
-              <a:t>More platforms supported (</a:t>
-            </a:r>
-            <a:r>
-              <a:rPr lang="en-US" dirty="0" smtClean="0"/>
-              <a:t>Android </a:t>
-            </a:r>
-            <a:r>
-              <a:rPr lang="en-US" dirty="0" smtClean="0"/>
-              <a:t>and </a:t>
+              <a:t>ore features and bug fixes</a:t>
+            </a:r>
+          </a:p>
+          <a:p>
+            <a:r>
+              <a:rPr lang="en-US" dirty="0" smtClean="0"/>
+              <a:t>More platforms supported (Android and </a:t>
             </a:r>
             <a:r>
               <a:rPr lang="en-US" dirty="0" err="1" smtClean="0"/>
@@ -9136,7 +8994,7 @@
           <a:p>
             <a:fld id="{945609F1-927E-1F48-80C4-EDD35FD55285}" type="datetime8">
               <a:rPr lang="en-GB" smtClean="0"/>
-              <a:t>22-Apr-2015 10:56</a:t>
+              <a:t>22-Apr-2015 12:47</a:t>
             </a:fld>
             <a:endParaRPr lang="en-US"/>
           </a:p>

</xml_diff>

<commit_message>
Team Meetings.  Even more typos and pointless changes!
</commit_message>
<xml_diff>
--- a/meetings/Exiv2-v0.24.1.pptx
+++ b/meetings/Exiv2-v0.24.1.pptx
@@ -874,7 +874,7 @@
           <a:p>
             <a:fld id="{50684158-AEF9-F541-B7F7-457AA9371B9F}" type="datetime8">
               <a:rPr lang="en-GB" smtClean="0"/>
-              <a:t>22-Apr-2015 12:47</a:t>
+              <a:t>22-Apr-2015 16:49</a:t>
             </a:fld>
             <a:endParaRPr lang="en-US"/>
           </a:p>
@@ -969,7 +969,7 @@
           <a:p>
             <a:fld id="{D4610EBB-D907-9449-8FEA-ED325EF61155}" type="datetime8">
               <a:rPr lang="en-GB" smtClean="0"/>
-              <a:t>22-Apr-2015 12:47</a:t>
+              <a:t>22-Apr-2015 16:49</a:t>
             </a:fld>
             <a:endParaRPr lang="en-US"/>
           </a:p>
@@ -1276,7 +1276,7 @@
           <a:p>
             <a:fld id="{453BA56C-E552-7340-BC54-08A9EBD5FC05}" type="datetime8">
               <a:rPr lang="en-GB" smtClean="0"/>
-              <a:t>22-Apr-2015 12:47</a:t>
+              <a:t>22-Apr-2015 16:49</a:t>
             </a:fld>
             <a:endParaRPr lang="en-US"/>
           </a:p>
@@ -1501,7 +1501,7 @@
           <a:p>
             <a:fld id="{4664B96B-42AD-F043-9EFC-F851190D4880}" type="datetime8">
               <a:rPr lang="en-GB" smtClean="0"/>
-              <a:t>22-Apr-2015 12:47</a:t>
+              <a:t>22-Apr-2015 16:49</a:t>
             </a:fld>
             <a:endParaRPr lang="en-US"/>
           </a:p>
@@ -1893,7 +1893,7 @@
           <a:p>
             <a:fld id="{8C4F81CC-6030-0D41-BD2B-2D55CBDB487B}" type="datetime8">
               <a:rPr lang="en-GB" smtClean="0"/>
-              <a:t>22-Apr-2015 12:47</a:t>
+              <a:t>22-Apr-2015 16:49</a:t>
             </a:fld>
             <a:endParaRPr lang="en-US"/>
           </a:p>
@@ -2205,7 +2205,7 @@
           <a:p>
             <a:fld id="{62099B12-AD97-F440-892A-1F99F7E663F8}" type="datetime8">
               <a:rPr lang="en-GB" smtClean="0"/>
-              <a:t>22-Apr-2015 12:47</a:t>
+              <a:t>22-Apr-2015 16:49</a:t>
             </a:fld>
             <a:endParaRPr lang="en-US"/>
           </a:p>
@@ -2407,7 +2407,7 @@
           <a:p>
             <a:fld id="{D2D478E8-B690-5B4A-8E03-205B27722A3E}" type="datetime8">
               <a:rPr lang="en-GB" smtClean="0"/>
-              <a:t>22-Apr-2015 12:47</a:t>
+              <a:t>22-Apr-2015 16:49</a:t>
             </a:fld>
             <a:endParaRPr lang="en-US"/>
           </a:p>
@@ -2614,7 +2614,7 @@
           <a:p>
             <a:fld id="{AD301DA1-92EC-4F4E-BF75-5D6EF2BECBCB}" type="datetime8">
               <a:rPr lang="en-GB" smtClean="0"/>
-              <a:t>22-Apr-2015 12:47</a:t>
+              <a:t>22-Apr-2015 16:49</a:t>
             </a:fld>
             <a:endParaRPr lang="en-US"/>
           </a:p>
@@ -2811,7 +2811,7 @@
           <a:p>
             <a:fld id="{C66E1988-3043-8F43-92FE-A5FA8C8F7BB7}" type="datetime8">
               <a:rPr lang="en-GB" smtClean="0"/>
-              <a:t>22-Apr-2015 12:47</a:t>
+              <a:t>22-Apr-2015 16:49</a:t>
             </a:fld>
             <a:endParaRPr lang="en-US"/>
           </a:p>
@@ -3087,7 +3087,7 @@
           <a:p>
             <a:fld id="{D29759E7-790C-D747-8166-EE5474C1982E}" type="datetime8">
               <a:rPr lang="en-GB" smtClean="0"/>
-              <a:t>22-Apr-2015 12:47</a:t>
+              <a:t>22-Apr-2015 16:49</a:t>
             </a:fld>
             <a:endParaRPr lang="en-US"/>
           </a:p>
@@ -3402,7 +3402,7 @@
           <a:p>
             <a:fld id="{FD7D5E06-F004-B741-A968-950EA387287B}" type="datetime8">
               <a:rPr lang="en-GB" smtClean="0"/>
-              <a:t>22-Apr-2015 12:47</a:t>
+              <a:t>22-Apr-2015 16:49</a:t>
             </a:fld>
             <a:endParaRPr lang="en-US"/>
           </a:p>
@@ -3872,7 +3872,7 @@
           <a:p>
             <a:fld id="{284F2FE9-C7F0-744B-94B3-7FB6C0C7A7AC}" type="datetime8">
               <a:rPr lang="en-GB" smtClean="0"/>
-              <a:t>22-Apr-2015 12:47</a:t>
+              <a:t>22-Apr-2015 16:49</a:t>
             </a:fld>
             <a:endParaRPr lang="en-US"/>
           </a:p>
@@ -4240,7 +4240,7 @@
           <a:p>
             <a:fld id="{84AE1E6E-75DA-F74A-9CB0-4A08E364BCC5}" type="datetime8">
               <a:rPr lang="en-GB" smtClean="0"/>
-              <a:t>22-Apr-2015 12:47</a:t>
+              <a:t>22-Apr-2015 16:49</a:t>
             </a:fld>
             <a:endParaRPr lang="en-US"/>
           </a:p>
@@ -4555,7 +4555,7 @@
           <a:p>
             <a:fld id="{470A43BE-DCB4-E441-84BC-9206BE09A6E9}" type="datetime8">
               <a:rPr lang="en-GB" smtClean="0"/>
-              <a:t>22-Apr-2015 12:47</a:t>
+              <a:t>22-Apr-2015 16:49</a:t>
             </a:fld>
             <a:endParaRPr lang="en-US"/>
           </a:p>
@@ -4870,7 +4870,7 @@
           <a:p>
             <a:fld id="{26B4B2EE-C089-0344-9BCB-E686BC5B579B}" type="datetime8">
               <a:rPr lang="en-GB" smtClean="0"/>
-              <a:t>22-Apr-2015 12:47</a:t>
+              <a:t>22-Apr-2015 16:49</a:t>
             </a:fld>
             <a:endParaRPr lang="en-US"/>
           </a:p>
@@ -5359,7 +5359,7 @@
           <a:p>
             <a:fld id="{13992AC6-5E03-F449-829F-139F3F0797E9}" type="datetime8">
               <a:rPr lang="en-GB" smtClean="0"/>
-              <a:t>22-Apr-2015 12:47</a:t>
+              <a:t>22-Apr-2015 16:49</a:t>
             </a:fld>
             <a:endParaRPr lang="en-US"/>
           </a:p>
@@ -5423,9 +5423,21 @@
 <p:sldMaster xmlns:a="http://schemas.openxmlformats.org/drawingml/2006/main" xmlns:r="http://schemas.openxmlformats.org/officeDocument/2006/relationships" xmlns:p="http://schemas.openxmlformats.org/presentationml/2006/main">
   <p:cSld>
     <p:bg>
-      <p:bgRef idx="1001">
-        <a:schemeClr val="bg1"/>
-      </p:bgRef>
+      <p:bgPr>
+        <a:gradFill flip="none" rotWithShape="0">
+          <a:gsLst>
+            <a:gs pos="0">
+              <a:schemeClr val="bg2"/>
+            </a:gs>
+            <a:gs pos="100000">
+              <a:srgbClr val="FFFFFF"/>
+            </a:gs>
+          </a:gsLst>
+          <a:lin ang="0" scaled="1"/>
+          <a:tileRect/>
+        </a:gradFill>
+        <a:effectLst/>
+      </p:bgPr>
     </p:bg>
     <p:spTree>
       <p:nvGrpSpPr>
@@ -5626,7 +5638,7 @@
           <a:p>
             <a:fld id="{F9F5659A-14A4-684C-8DFF-B535F8211020}" type="datetime8">
               <a:rPr lang="en-GB" smtClean="0"/>
-              <a:t>22-Apr-2015 12:47</a:t>
+              <a:t>22-Apr-2015 16:49</a:t>
             </a:fld>
             <a:endParaRPr lang="en-US"/>
           </a:p>
@@ -6284,7 +6296,7 @@
           <a:p>
             <a:fld id="{A24E8C0C-F230-ED46-AB54-3A6B4B9814E6}" type="datetime8">
               <a:rPr lang="en-GB" smtClean="0"/>
-              <a:t>22-Apr-2015 12:47</a:t>
+              <a:t>22-Apr-2015 16:49</a:t>
             </a:fld>
             <a:endParaRPr lang="en-US"/>
           </a:p>
@@ -6441,7 +6453,19 @@
             </a:br>
             <a:r>
               <a:rPr lang="en-US" dirty="0" smtClean="0"/>
-              <a:t>Many bug fixes, function changes and new features</a:t>
+              <a:t>Many bug fixes</a:t>
+            </a:r>
+            <a:r>
+              <a:rPr lang="en-US" smtClean="0"/>
+              <a:t>, </a:t>
+            </a:r>
+            <a:r>
+              <a:rPr lang="en-US" smtClean="0"/>
+              <a:t>functional </a:t>
+            </a:r>
+            <a:r>
+              <a:rPr lang="en-US" dirty="0" smtClean="0"/>
+              <a:t>changes and new features</a:t>
             </a:r>
             <a:br>
               <a:rPr lang="en-US" dirty="0" smtClean="0"/>
@@ -6511,6 +6535,10 @@
             <a:br>
               <a:rPr lang="en-US" dirty="0" smtClean="0"/>
             </a:br>
+            <a:r>
+              <a:rPr lang="en-US" dirty="0" smtClean="0"/>
+              <a:t>Update to latest (and external) </a:t>
+            </a:r>
             <a:r>
               <a:rPr lang="en-US" dirty="0" err="1" smtClean="0"/>
               <a:t>XMPsdk</a:t>
@@ -6580,7 +6608,7 @@
           <a:p>
             <a:fld id="{E6B5324F-4486-2849-B445-126A99F33717}" type="datetime8">
               <a:rPr lang="en-GB" smtClean="0"/>
-              <a:t>22-Apr-2015 12:47</a:t>
+              <a:t>22-Apr-2015 16:49</a:t>
             </a:fld>
             <a:endParaRPr lang="en-US"/>
           </a:p>
@@ -6728,7 +6756,27 @@
           <a:p>
             <a:r>
               <a:rPr lang="en-US" dirty="0" smtClean="0"/>
-              <a:t>Other useful discussion points if time permits</a:t>
+              <a:t>Other useful discussion </a:t>
+            </a:r>
+            <a:r>
+              <a:rPr lang="en-US" dirty="0" smtClean="0"/>
+              <a:t>item</a:t>
+            </a:r>
+            <a:r>
+              <a:rPr lang="en-US" dirty="0" smtClean="0"/>
+              <a:t>s </a:t>
+            </a:r>
+            <a:r>
+              <a:rPr lang="en-US" dirty="0" smtClean="0"/>
+              <a:t>if time </a:t>
+            </a:r>
+            <a:r>
+              <a:rPr lang="en-US" dirty="0" smtClean="0"/>
+              <a:t>permits:</a:t>
+            </a:r>
+            <a:r>
+              <a:rPr lang="en-US" dirty="0" smtClean="0"/>
+              <a:t/>
             </a:r>
             <a:br>
               <a:rPr lang="en-US" dirty="0" smtClean="0"/>
@@ -6808,7 +6856,7 @@
           <a:p>
             <a:fld id="{12B447A4-3CD3-0243-900F-09A087B85CA8}" type="datetime8">
               <a:rPr lang="en-GB" smtClean="0"/>
-              <a:t>22-Apr-2015 12:47</a:t>
+              <a:t>22-Apr-2015 16:49</a:t>
             </a:fld>
             <a:endParaRPr lang="en-US"/>
           </a:p>
@@ -7644,7 +7692,7 @@
           <a:p>
             <a:fld id="{12824A3B-A608-3947-81FA-B42F5DA9341C}" type="datetime8">
               <a:rPr lang="en-GB" smtClean="0"/>
-              <a:t>22-Apr-2015 12:47</a:t>
+              <a:t>22-Apr-2015 16:49</a:t>
             </a:fld>
             <a:endParaRPr lang="en-US"/>
           </a:p>
@@ -7876,7 +7924,7 @@
           <a:p>
             <a:fld id="{5379D298-6F44-4A45-8706-E97D04C346BD}" type="datetime8">
               <a:rPr lang="en-GB" smtClean="0"/>
-              <a:t>22-Apr-2015 12:47</a:t>
+              <a:t>22-Apr-2015 16:49</a:t>
             </a:fld>
             <a:endParaRPr lang="en-US"/>
           </a:p>
@@ -8005,27 +8053,7 @@
             </a:br>
             <a:r>
               <a:rPr lang="en-US" dirty="0" smtClean="0"/>
-              <a:t>(as </a:t>
-            </a:r>
-            <a:r>
-              <a:rPr lang="en-US" dirty="0" smtClean="0"/>
-              <a:t>already</a:t>
-            </a:r>
-            <a:r>
-              <a:rPr lang="en-US" dirty="0" smtClean="0"/>
-              <a:t> </a:t>
-            </a:r>
-            <a:r>
-              <a:rPr lang="en-US" dirty="0" smtClean="0"/>
-              <a:t>done </a:t>
-            </a:r>
-            <a:r>
-              <a:rPr lang="en-US" dirty="0" smtClean="0"/>
-              <a:t>for</a:t>
-            </a:r>
-            <a:r>
-              <a:rPr lang="en-US" dirty="0" smtClean="0"/>
-              <a:t> </a:t>
+              <a:t>(as already done for </a:t>
             </a:r>
             <a:r>
               <a:rPr lang="en-US" dirty="0" err="1" smtClean="0"/>
@@ -8033,37 +8061,13 @@
             </a:r>
             <a:r>
               <a:rPr lang="en-US" dirty="0" smtClean="0"/>
-              <a:t> </a:t>
-            </a:r>
-            <a:r>
-              <a:rPr lang="en-US" dirty="0" smtClean="0"/>
-              <a:t>in</a:t>
-            </a:r>
-            <a:r>
-              <a:rPr lang="en-US" dirty="0" smtClean="0"/>
-              <a:t> </a:t>
-            </a:r>
-            <a:r>
-              <a:rPr lang="en-US" dirty="0" smtClean="0"/>
-              <a:t>v0.25)</a:t>
-            </a:r>
-          </a:p>
-          <a:p>
-            <a:r>
-              <a:rPr lang="en-US" dirty="0" smtClean="0"/>
-              <a:t>The </a:t>
-            </a:r>
-            <a:r>
-              <a:rPr lang="en-US" dirty="0" smtClean="0"/>
-              <a:t>video code requires </a:t>
-            </a:r>
-            <a:r>
-              <a:rPr lang="en-US" dirty="0" smtClean="0"/>
-              <a:t>simplification:</a:t>
-            </a:r>
-            <a:r>
-              <a:rPr lang="en-US" dirty="0" smtClean="0"/>
-              <a:t/>
+              <a:t> in v0.25)</a:t>
+            </a:r>
+          </a:p>
+          <a:p>
+            <a:r>
+              <a:rPr lang="en-US" dirty="0" smtClean="0"/>
+              <a:t>The video code requires simplification:</a:t>
             </a:r>
             <a:br>
               <a:rPr lang="en-US" dirty="0" smtClean="0"/>
@@ -8111,11 +8115,7 @@
             </a:r>
             <a:r>
               <a:rPr lang="en-US" dirty="0" smtClean="0"/>
-              <a:t>(5Gbyte video files over http</a:t>
-            </a:r>
-            <a:r>
-              <a:rPr lang="en-US" dirty="0" smtClean="0"/>
-              <a:t>)</a:t>
+              <a:t>(5Gbyte video files over http)</a:t>
             </a:r>
           </a:p>
           <a:p>
@@ -8178,7 +8178,7 @@
           <a:p>
             <a:fld id="{A23348B8-C2FC-BD41-B270-BEDAFEEE35DB}" type="datetime8">
               <a:rPr lang="en-GB" smtClean="0"/>
-              <a:t>22-Apr-2015 12:49</a:t>
+              <a:t>22-Apr-2015 16:49</a:t>
             </a:fld>
             <a:endParaRPr lang="en-US"/>
           </a:p>
@@ -8445,7 +8445,7 @@
           <a:p>
             <a:fld id="{0FE6EDA9-5A32-FE44-8CF4-C32B08FF5187}" type="datetime8">
               <a:rPr lang="en-GB" smtClean="0"/>
-              <a:t>22-Apr-2015 12:47</a:t>
+              <a:t>22-Apr-2015 16:49</a:t>
             </a:fld>
             <a:endParaRPr lang="en-US"/>
           </a:p>
@@ -8725,7 +8725,7 @@
           <a:p>
             <a:fld id="{E78FA98F-E1CA-5346-B70E-AE0F4504117E}" type="datetime8">
               <a:rPr lang="en-GB" smtClean="0"/>
-              <a:t>22-Apr-2015 12:47</a:t>
+              <a:t>22-Apr-2015 16:49</a:t>
             </a:fld>
             <a:endParaRPr lang="en-US"/>
           </a:p>
@@ -8891,17 +8891,25 @@
           <a:p>
             <a:r>
               <a:rPr lang="en-US" dirty="0"/>
-              <a:t>M</a:t>
-            </a:r>
-            <a:r>
-              <a:rPr lang="en-US" dirty="0" smtClean="0"/>
-              <a:t>ore features and bug fixes</a:t>
-            </a:r>
-          </a:p>
-          <a:p>
-            <a:r>
-              <a:rPr lang="en-US" dirty="0" smtClean="0"/>
-              <a:t>More platforms supported (Android and </a:t>
+              <a:t>Upgrade code to link </a:t>
+            </a:r>
+            <a:r>
+              <a:rPr lang="en-US" dirty="0" err="1"/>
+              <a:t>XMPsdk</a:t>
+            </a:r>
+            <a:r>
+              <a:rPr lang="en-US" dirty="0"/>
+              <a:t> as an external library</a:t>
+            </a:r>
+          </a:p>
+          <a:p>
+            <a:r>
+              <a:rPr lang="en-US" dirty="0" smtClean="0"/>
+              <a:t>More </a:t>
+            </a:r>
+            <a:r>
+              <a:rPr lang="en-US" dirty="0" smtClean="0"/>
+              <a:t>platforms supported (Android and </a:t>
             </a:r>
             <a:r>
               <a:rPr lang="en-US" dirty="0" err="1" smtClean="0"/>
@@ -8914,22 +8922,18 @@
           </a:p>
           <a:p>
             <a:r>
-              <a:rPr lang="en-US" dirty="0" smtClean="0"/>
-              <a:t>Upgrade code to link </a:t>
-            </a:r>
-            <a:r>
-              <a:rPr lang="en-US" dirty="0" err="1" smtClean="0"/>
-              <a:t>XMPsdk</a:t>
-            </a:r>
-            <a:r>
-              <a:rPr lang="en-US" dirty="0" smtClean="0"/>
-              <a:t> as an external library</a:t>
-            </a:r>
-          </a:p>
-          <a:p>
-            <a:r>
-              <a:rPr lang="en-US" dirty="0" smtClean="0"/>
-              <a:t>Better Program Management</a:t>
+              <a:rPr lang="en-US" dirty="0"/>
+              <a:t>More features and bug fixes</a:t>
+            </a:r>
+          </a:p>
+          <a:p>
+            <a:r>
+              <a:rPr lang="en-US" dirty="0" smtClean="0"/>
+              <a:t>Better </a:t>
+            </a:r>
+            <a:r>
+              <a:rPr lang="en-US" dirty="0" smtClean="0"/>
+              <a:t>Program Management</a:t>
             </a:r>
           </a:p>
           <a:p>
@@ -8941,7 +8945,15 @@
           <a:p>
             <a:r>
               <a:rPr lang="en-US" dirty="0" smtClean="0"/>
-              <a:t>Team members should ‘own’ responsibilities</a:t>
+              <a:t>Team members </a:t>
+            </a:r>
+            <a:r>
+              <a:rPr lang="en-US" dirty="0" smtClean="0"/>
+              <a:t>to be ‘owners’ of </a:t>
+            </a:r>
+            <a:r>
+              <a:rPr lang="en-US" dirty="0" smtClean="0"/>
+              <a:t>responsibilities</a:t>
             </a:r>
             <a:endParaRPr lang="en-US" dirty="0"/>
           </a:p>
@@ -8994,7 +9006,7 @@
           <a:p>
             <a:fld id="{945609F1-927E-1F48-80C4-EDD35FD55285}" type="datetime8">
               <a:rPr lang="en-GB" smtClean="0"/>
-              <a:t>22-Apr-2015 12:47</a:t>
+              <a:t>22-Apr-2015 17:00</a:t>
             </a:fld>
             <a:endParaRPr lang="en-US"/>
           </a:p>
@@ -9016,10 +9028,10 @@
           <a:lstStyle/>
           <a:p>
             <a:r>
-              <a:rPr lang="en-US" smtClean="0"/>
+              <a:rPr lang="en-US" dirty="0" smtClean="0"/>
               <a:t>Exiv2-v0.24.1</a:t>
             </a:r>
-            <a:endParaRPr lang="en-US"/>
+            <a:endParaRPr lang="en-US" dirty="0"/>
           </a:p>
         </p:txBody>
       </p:sp>

</xml_diff>

<commit_message>
Team Meeting.  Final polish.
</commit_message>
<xml_diff>
--- a/meetings/Exiv2-v0.24.1.pptx
+++ b/meetings/Exiv2-v0.24.1.pptx
@@ -874,7 +874,7 @@
           <a:p>
             <a:fld id="{50684158-AEF9-F541-B7F7-457AA9371B9F}" type="datetime8">
               <a:rPr lang="en-GB" smtClean="0"/>
-              <a:t>22-Apr-2015 16:49</a:t>
+              <a:t>22-Apr-2015 20:18</a:t>
             </a:fld>
             <a:endParaRPr lang="en-US"/>
           </a:p>
@@ -969,7 +969,7 @@
           <a:p>
             <a:fld id="{D4610EBB-D907-9449-8FEA-ED325EF61155}" type="datetime8">
               <a:rPr lang="en-GB" smtClean="0"/>
-              <a:t>22-Apr-2015 16:49</a:t>
+              <a:t>22-Apr-2015 20:18</a:t>
             </a:fld>
             <a:endParaRPr lang="en-US"/>
           </a:p>
@@ -1276,7 +1276,7 @@
           <a:p>
             <a:fld id="{453BA56C-E552-7340-BC54-08A9EBD5FC05}" type="datetime8">
               <a:rPr lang="en-GB" smtClean="0"/>
-              <a:t>22-Apr-2015 16:49</a:t>
+              <a:t>22-Apr-2015 20:18</a:t>
             </a:fld>
             <a:endParaRPr lang="en-US"/>
           </a:p>
@@ -1501,7 +1501,7 @@
           <a:p>
             <a:fld id="{4664B96B-42AD-F043-9EFC-F851190D4880}" type="datetime8">
               <a:rPr lang="en-GB" smtClean="0"/>
-              <a:t>22-Apr-2015 16:49</a:t>
+              <a:t>22-Apr-2015 20:18</a:t>
             </a:fld>
             <a:endParaRPr lang="en-US"/>
           </a:p>
@@ -1893,7 +1893,7 @@
           <a:p>
             <a:fld id="{8C4F81CC-6030-0D41-BD2B-2D55CBDB487B}" type="datetime8">
               <a:rPr lang="en-GB" smtClean="0"/>
-              <a:t>22-Apr-2015 16:49</a:t>
+              <a:t>22-Apr-2015 20:18</a:t>
             </a:fld>
             <a:endParaRPr lang="en-US"/>
           </a:p>
@@ -2205,7 +2205,7 @@
           <a:p>
             <a:fld id="{62099B12-AD97-F440-892A-1F99F7E663F8}" type="datetime8">
               <a:rPr lang="en-GB" smtClean="0"/>
-              <a:t>22-Apr-2015 16:49</a:t>
+              <a:t>22-Apr-2015 20:18</a:t>
             </a:fld>
             <a:endParaRPr lang="en-US"/>
           </a:p>
@@ -2407,7 +2407,7 @@
           <a:p>
             <a:fld id="{D2D478E8-B690-5B4A-8E03-205B27722A3E}" type="datetime8">
               <a:rPr lang="en-GB" smtClean="0"/>
-              <a:t>22-Apr-2015 16:49</a:t>
+              <a:t>22-Apr-2015 20:18</a:t>
             </a:fld>
             <a:endParaRPr lang="en-US"/>
           </a:p>
@@ -2614,7 +2614,7 @@
           <a:p>
             <a:fld id="{AD301DA1-92EC-4F4E-BF75-5D6EF2BECBCB}" type="datetime8">
               <a:rPr lang="en-GB" smtClean="0"/>
-              <a:t>22-Apr-2015 16:49</a:t>
+              <a:t>22-Apr-2015 20:18</a:t>
             </a:fld>
             <a:endParaRPr lang="en-US"/>
           </a:p>
@@ -2811,7 +2811,7 @@
           <a:p>
             <a:fld id="{C66E1988-3043-8F43-92FE-A5FA8C8F7BB7}" type="datetime8">
               <a:rPr lang="en-GB" smtClean="0"/>
-              <a:t>22-Apr-2015 16:49</a:t>
+              <a:t>22-Apr-2015 20:18</a:t>
             </a:fld>
             <a:endParaRPr lang="en-US"/>
           </a:p>
@@ -3087,7 +3087,7 @@
           <a:p>
             <a:fld id="{D29759E7-790C-D747-8166-EE5474C1982E}" type="datetime8">
               <a:rPr lang="en-GB" smtClean="0"/>
-              <a:t>22-Apr-2015 16:49</a:t>
+              <a:t>22-Apr-2015 20:18</a:t>
             </a:fld>
             <a:endParaRPr lang="en-US"/>
           </a:p>
@@ -3402,7 +3402,7 @@
           <a:p>
             <a:fld id="{FD7D5E06-F004-B741-A968-950EA387287B}" type="datetime8">
               <a:rPr lang="en-GB" smtClean="0"/>
-              <a:t>22-Apr-2015 16:49</a:t>
+              <a:t>22-Apr-2015 20:18</a:t>
             </a:fld>
             <a:endParaRPr lang="en-US"/>
           </a:p>
@@ -3872,7 +3872,7 @@
           <a:p>
             <a:fld id="{284F2FE9-C7F0-744B-94B3-7FB6C0C7A7AC}" type="datetime8">
               <a:rPr lang="en-GB" smtClean="0"/>
-              <a:t>22-Apr-2015 16:49</a:t>
+              <a:t>22-Apr-2015 20:18</a:t>
             </a:fld>
             <a:endParaRPr lang="en-US"/>
           </a:p>
@@ -4240,7 +4240,7 @@
           <a:p>
             <a:fld id="{84AE1E6E-75DA-F74A-9CB0-4A08E364BCC5}" type="datetime8">
               <a:rPr lang="en-GB" smtClean="0"/>
-              <a:t>22-Apr-2015 16:49</a:t>
+              <a:t>22-Apr-2015 20:18</a:t>
             </a:fld>
             <a:endParaRPr lang="en-US"/>
           </a:p>
@@ -4555,7 +4555,7 @@
           <a:p>
             <a:fld id="{470A43BE-DCB4-E441-84BC-9206BE09A6E9}" type="datetime8">
               <a:rPr lang="en-GB" smtClean="0"/>
-              <a:t>22-Apr-2015 16:49</a:t>
+              <a:t>22-Apr-2015 20:18</a:t>
             </a:fld>
             <a:endParaRPr lang="en-US"/>
           </a:p>
@@ -4870,7 +4870,7 @@
           <a:p>
             <a:fld id="{26B4B2EE-C089-0344-9BCB-E686BC5B579B}" type="datetime8">
               <a:rPr lang="en-GB" smtClean="0"/>
-              <a:t>22-Apr-2015 16:49</a:t>
+              <a:t>22-Apr-2015 20:18</a:t>
             </a:fld>
             <a:endParaRPr lang="en-US"/>
           </a:p>
@@ -5359,7 +5359,7 @@
           <a:p>
             <a:fld id="{13992AC6-5E03-F449-829F-139F3F0797E9}" type="datetime8">
               <a:rPr lang="en-GB" smtClean="0"/>
-              <a:t>22-Apr-2015 16:49</a:t>
+              <a:t>22-Apr-2015 20:18</a:t>
             </a:fld>
             <a:endParaRPr lang="en-US"/>
           </a:p>
@@ -5638,7 +5638,7 @@
           <a:p>
             <a:fld id="{F9F5659A-14A4-684C-8DFF-B535F8211020}" type="datetime8">
               <a:rPr lang="en-GB" smtClean="0"/>
-              <a:t>22-Apr-2015 16:49</a:t>
+              <a:t>22-Apr-2015 20:18</a:t>
             </a:fld>
             <a:endParaRPr lang="en-US"/>
           </a:p>
@@ -6054,7 +6054,11 @@
           <a:p>
             <a:r>
               <a:rPr lang="en-US" dirty="0" smtClean="0"/>
-              <a:t>KDE Security Issue</a:t>
+              <a:t> Team Meeting to discuss KDE </a:t>
+            </a:r>
+            <a:r>
+              <a:rPr lang="en-US" dirty="0" smtClean="0"/>
+              <a:t>Security Issue</a:t>
             </a:r>
             <a:endParaRPr lang="en-US" dirty="0"/>
           </a:p>
@@ -6182,7 +6186,15 @@
           <a:p>
             <a:r>
               <a:rPr lang="en-US" dirty="0" smtClean="0"/>
-              <a:t>Most C++ code and test harness is excellent thanks to:</a:t>
+              <a:t>Most C++ code and test harness is </a:t>
+            </a:r>
+            <a:r>
+              <a:rPr lang="en-US" dirty="0" smtClean="0"/>
+              <a:t>excellent:</a:t>
+            </a:r>
+            <a:r>
+              <a:rPr lang="en-US" dirty="0" smtClean="0"/>
+              <a:t/>
             </a:r>
             <a:br>
               <a:rPr lang="en-US" dirty="0" smtClean="0"/>
@@ -6296,7 +6308,7 @@
           <a:p>
             <a:fld id="{A24E8C0C-F230-ED46-AB54-3A6B4B9814E6}" type="datetime8">
               <a:rPr lang="en-GB" smtClean="0"/>
-              <a:t>22-Apr-2015 16:49</a:t>
+              <a:t>22-Apr-2015 20:18</a:t>
             </a:fld>
             <a:endParaRPr lang="en-US"/>
           </a:p>
@@ -6457,11 +6469,7 @@
             </a:r>
             <a:r>
               <a:rPr lang="en-US" smtClean="0"/>
-              <a:t>, </a:t>
-            </a:r>
-            <a:r>
-              <a:rPr lang="en-US" smtClean="0"/>
-              <a:t>functional </a:t>
+              <a:t>, functional </a:t>
             </a:r>
             <a:r>
               <a:rPr lang="en-US" dirty="0" smtClean="0"/>
@@ -6608,7 +6616,7 @@
           <a:p>
             <a:fld id="{E6B5324F-4486-2849-B445-126A99F33717}" type="datetime8">
               <a:rPr lang="en-GB" smtClean="0"/>
-              <a:t>22-Apr-2015 16:49</a:t>
+              <a:t>22-Apr-2015 20:18</a:t>
             </a:fld>
             <a:endParaRPr lang="en-US"/>
           </a:p>
@@ -6756,27 +6764,7 @@
           <a:p>
             <a:r>
               <a:rPr lang="en-US" dirty="0" smtClean="0"/>
-              <a:t>Other useful discussion </a:t>
-            </a:r>
-            <a:r>
-              <a:rPr lang="en-US" dirty="0" smtClean="0"/>
-              <a:t>item</a:t>
-            </a:r>
-            <a:r>
-              <a:rPr lang="en-US" dirty="0" smtClean="0"/>
-              <a:t>s </a:t>
-            </a:r>
-            <a:r>
-              <a:rPr lang="en-US" dirty="0" smtClean="0"/>
-              <a:t>if time </a:t>
-            </a:r>
-            <a:r>
-              <a:rPr lang="en-US" dirty="0" smtClean="0"/>
-              <a:t>permits:</a:t>
-            </a:r>
-            <a:r>
-              <a:rPr lang="en-US" dirty="0" smtClean="0"/>
-              <a:t/>
+              <a:t>Other useful discussion items if time permits:</a:t>
             </a:r>
             <a:br>
               <a:rPr lang="en-US" dirty="0" smtClean="0"/>
@@ -6856,7 +6844,7 @@
           <a:p>
             <a:fld id="{12B447A4-3CD3-0243-900F-09A087B85CA8}" type="datetime8">
               <a:rPr lang="en-GB" smtClean="0"/>
-              <a:t>22-Apr-2015 16:49</a:t>
+              <a:t>22-Apr-2015 20:18</a:t>
             </a:fld>
             <a:endParaRPr lang="en-US"/>
           </a:p>
@@ -7692,7 +7680,7 @@
           <a:p>
             <a:fld id="{12824A3B-A608-3947-81FA-B42F5DA9341C}" type="datetime8">
               <a:rPr lang="en-GB" smtClean="0"/>
-              <a:t>22-Apr-2015 16:49</a:t>
+              <a:t>22-Apr-2015 20:18</a:t>
             </a:fld>
             <a:endParaRPr lang="en-US"/>
           </a:p>
@@ -7924,7 +7912,7 @@
           <a:p>
             <a:fld id="{5379D298-6F44-4A45-8706-E97D04C346BD}" type="datetime8">
               <a:rPr lang="en-GB" smtClean="0"/>
-              <a:t>22-Apr-2015 16:49</a:t>
+              <a:t>22-Apr-2015 20:18</a:t>
             </a:fld>
             <a:endParaRPr lang="en-US"/>
           </a:p>
@@ -8066,8 +8054,16 @@
           </a:p>
           <a:p>
             <a:r>
-              <a:rPr lang="en-US" dirty="0" smtClean="0"/>
-              <a:t>The video code requires simplification:</a:t>
+              <a:rPr lang="en-US" dirty="0"/>
+              <a:t>V</a:t>
+            </a:r>
+            <a:r>
+              <a:rPr lang="en-US" dirty="0" smtClean="0"/>
+              <a:t>ideo </a:t>
+            </a:r>
+            <a:r>
+              <a:rPr lang="en-US" dirty="0" smtClean="0"/>
+              <a:t>code requires simplification:</a:t>
             </a:r>
             <a:br>
               <a:rPr lang="en-US" dirty="0" smtClean="0"/>
@@ -8178,7 +8174,7 @@
           <a:p>
             <a:fld id="{A23348B8-C2FC-BD41-B270-BEDAFEEE35DB}" type="datetime8">
               <a:rPr lang="en-GB" smtClean="0"/>
-              <a:t>22-Apr-2015 16:49</a:t>
+              <a:t>22-Apr-2015 20:18</a:t>
             </a:fld>
             <a:endParaRPr lang="en-US"/>
           </a:p>
@@ -8445,7 +8441,7 @@
           <a:p>
             <a:fld id="{0FE6EDA9-5A32-FE44-8CF4-C32B08FF5187}" type="datetime8">
               <a:rPr lang="en-GB" smtClean="0"/>
-              <a:t>22-Apr-2015 16:49</a:t>
+              <a:t>22-Apr-2015 20:18</a:t>
             </a:fld>
             <a:endParaRPr lang="en-US"/>
           </a:p>
@@ -8725,7 +8721,7 @@
           <a:p>
             <a:fld id="{E78FA98F-E1CA-5346-B70E-AE0F4504117E}" type="datetime8">
               <a:rPr lang="en-GB" smtClean="0"/>
-              <a:t>22-Apr-2015 16:49</a:t>
+              <a:t>22-Apr-2015 20:18</a:t>
             </a:fld>
             <a:endParaRPr lang="en-US"/>
           </a:p>
@@ -8849,8 +8845,21 @@
           <a:p>
             <a:r>
               <a:rPr lang="en-US" dirty="0" smtClean="0"/>
-              <a:t>Video Code (read and write)</a:t>
-            </a:r>
+              <a:t>Video </a:t>
+            </a:r>
+            <a:r>
+              <a:rPr lang="en-US" dirty="0" smtClean="0"/>
+              <a:t>Read and Write 			</a:t>
+            </a:r>
+            <a:r>
+              <a:rPr lang="en-US" dirty="0" err="1" smtClean="0"/>
+              <a:t>Abhinav</a:t>
+            </a:r>
+            <a:r>
+              <a:rPr lang="en-US" dirty="0" smtClean="0"/>
+              <a:t> and Mahesh</a:t>
+            </a:r>
+            <a:endParaRPr lang="en-US" dirty="0" smtClean="0"/>
           </a:p>
           <a:p>
             <a:r>
@@ -8871,7 +8880,7 @@
             </a:r>
             <a:r>
               <a:rPr lang="en-US" dirty="0" smtClean="0"/>
-              <a:t> support (</a:t>
+              <a:t> </a:t>
             </a:r>
             <a:r>
               <a:rPr lang="en-US" dirty="0" err="1" smtClean="0"/>
@@ -8879,37 +8888,78 @@
             </a:r>
             <a:r>
               <a:rPr lang="en-US" dirty="0" smtClean="0"/>
-              <a:t> 2015)</a:t>
-            </a:r>
-          </a:p>
-          <a:p>
-            <a:r>
-              <a:rPr lang="en-US" dirty="0" smtClean="0"/>
-              <a:t>Accessory ‘overflow’ file (Thomas B)</a:t>
-            </a:r>
-          </a:p>
-          <a:p>
+              <a:t> 2015</a:t>
+            </a:r>
+            <a:r>
+              <a:rPr lang="en-US" dirty="0" smtClean="0"/>
+              <a:t> 		Islam</a:t>
+            </a:r>
+            <a:endParaRPr lang="en-US" dirty="0" smtClean="0"/>
+          </a:p>
+          <a:p>
+            <a:r>
+              <a:rPr lang="en-US" dirty="0" smtClean="0"/>
+              <a:t>Accessory ‘overflow’ file </a:t>
+            </a:r>
+            <a:r>
+              <a:rPr lang="en-US" dirty="0" smtClean="0"/>
+              <a:t>		Thomas B</a:t>
+            </a:r>
+            <a:endParaRPr lang="en-US" dirty="0" smtClean="0"/>
+          </a:p>
+          <a:p>
+            <a:r>
+              <a:rPr lang="en-US" dirty="0" err="1" smtClean="0"/>
+              <a:t>XMPsdk</a:t>
+            </a:r>
+            <a:r>
+              <a:rPr lang="en-US" dirty="0" smtClean="0"/>
+              <a:t> </a:t>
+            </a:r>
             <a:r>
               <a:rPr lang="en-US" dirty="0"/>
-              <a:t>Upgrade code to link </a:t>
-            </a:r>
-            <a:r>
-              <a:rPr lang="en-US" dirty="0" err="1"/>
-              <a:t>XMPsdk</a:t>
+              <a:t>as an external </a:t>
+            </a:r>
+            <a:r>
+              <a:rPr lang="en-US" dirty="0" smtClean="0"/>
+              <a:t>library </a:t>
             </a:r>
             <a:r>
               <a:rPr lang="en-US" dirty="0"/>
-              <a:t> as an external library</a:t>
-            </a:r>
-          </a:p>
-          <a:p>
-            <a:r>
-              <a:rPr lang="en-US" dirty="0" smtClean="0"/>
-              <a:t>More </a:t>
-            </a:r>
-            <a:r>
-              <a:rPr lang="en-US" dirty="0" smtClean="0"/>
-              <a:t>platforms supported (Android and </a:t>
+              <a:t>	</a:t>
+            </a:r>
+            <a:r>
+              <a:rPr lang="en-US" dirty="0" smtClean="0"/>
+              <a:t>	</a:t>
+            </a:r>
+            <a:r>
+              <a:rPr lang="en-US" dirty="0" smtClean="0"/>
+              <a:t>Andreas</a:t>
+            </a:r>
+          </a:p>
+          <a:p>
+            <a:r>
+              <a:rPr lang="en-US" dirty="0" err="1" smtClean="0"/>
+              <a:t>Coverity</a:t>
+            </a:r>
+            <a:r>
+              <a:rPr lang="en-US" dirty="0" smtClean="0"/>
+              <a:t> Scan				Mahesh</a:t>
+            </a:r>
+            <a:endParaRPr lang="en-US" dirty="0"/>
+          </a:p>
+          <a:p>
+            <a:r>
+              <a:rPr lang="en-US" dirty="0" err="1" smtClean="0"/>
+              <a:t>Cmake</a:t>
+            </a:r>
+            <a:r>
+              <a:rPr lang="en-US" dirty="0" smtClean="0"/>
+              <a:t>/MSVC Android </a:t>
+            </a:r>
+            <a:r>
+              <a:rPr lang="en-US" dirty="0" smtClean="0"/>
+              <a:t>and </a:t>
             </a:r>
             <a:r>
               <a:rPr lang="en-US" dirty="0" err="1" smtClean="0"/>
@@ -8917,14 +8967,28 @@
             </a:r>
             <a:r>
               <a:rPr lang="en-US" dirty="0" smtClean="0"/>
-              <a:t>)</a:t>
-            </a:r>
-          </a:p>
-          <a:p>
+              <a:t> </a:t>
+            </a:r>
             <a:r>
               <a:rPr lang="en-US" dirty="0"/>
-              <a:t>More features and bug fixes</a:t>
-            </a:r>
+              <a:t>	</a:t>
+            </a:r>
+            <a:r>
+              <a:rPr lang="en-US" dirty="0" smtClean="0"/>
+              <a:t>	Robin</a:t>
+            </a:r>
+            <a:endParaRPr lang="en-US" dirty="0" smtClean="0"/>
+          </a:p>
+          <a:p>
+            <a:r>
+              <a:rPr lang="en-US" dirty="0"/>
+              <a:t>More features and bug </a:t>
+            </a:r>
+            <a:r>
+              <a:rPr lang="en-US" dirty="0" smtClean="0"/>
+              <a:t>fixes		Alan and Thomas S</a:t>
+            </a:r>
+            <a:endParaRPr lang="en-US" dirty="0"/>
           </a:p>
           <a:p>
             <a:r>
@@ -8933,29 +8997,43 @@
             </a:r>
             <a:r>
               <a:rPr lang="en-US" dirty="0" smtClean="0"/>
-              <a:t>Program Management</a:t>
-            </a:r>
-          </a:p>
-          <a:p>
-            <a:r>
-              <a:rPr lang="en-US" dirty="0" smtClean="0"/>
-              <a:t>Improved infra-structure</a:t>
-            </a:r>
-          </a:p>
-          <a:p>
-            <a:r>
-              <a:rPr lang="en-US" dirty="0" smtClean="0"/>
-              <a:t>Team members </a:t>
-            </a:r>
-            <a:r>
-              <a:rPr lang="en-US" dirty="0" smtClean="0"/>
-              <a:t>to be ‘owners’ of </a:t>
-            </a:r>
-            <a:r>
-              <a:rPr lang="en-US" dirty="0" smtClean="0"/>
-              <a:t>responsibilities</a:t>
-            </a:r>
-            <a:endParaRPr lang="en-US" dirty="0"/>
+              <a:t>Server </a:t>
+            </a:r>
+            <a:r>
+              <a:rPr lang="en-US" dirty="0" smtClean="0"/>
+              <a:t>&amp; </a:t>
+            </a:r>
+            <a:r>
+              <a:rPr lang="en-US" dirty="0" smtClean="0"/>
+              <a:t>Release Management </a:t>
+            </a:r>
+            <a:r>
+              <a:rPr lang="en-US" dirty="0"/>
+              <a:t>	</a:t>
+            </a:r>
+            <a:r>
+              <a:rPr lang="en-US" dirty="0" err="1" smtClean="0"/>
+              <a:t>Nehal</a:t>
+            </a:r>
+            <a:r>
+              <a:rPr lang="en-US" dirty="0" smtClean="0"/>
+              <a:t> and </a:t>
+            </a:r>
+            <a:r>
+              <a:rPr lang="en-US" dirty="0" smtClean="0"/>
+              <a:t>Shawn</a:t>
+            </a:r>
+          </a:p>
+          <a:p>
+            <a:r>
+              <a:rPr lang="en-US" dirty="0" smtClean="0"/>
+              <a:t>Branding, Logo and W</a:t>
+            </a:r>
+            <a:r>
+              <a:rPr lang="en-US" dirty="0" smtClean="0"/>
+              <a:t>eb-site		Ocean</a:t>
+            </a:r>
+            <a:endParaRPr lang="en-US" dirty="0" smtClean="0"/>
           </a:p>
         </p:txBody>
       </p:sp>
@@ -9006,7 +9084,7 @@
           <a:p>
             <a:fld id="{945609F1-927E-1F48-80C4-EDD35FD55285}" type="datetime8">
               <a:rPr lang="en-GB" smtClean="0"/>
-              <a:t>22-Apr-2015 17:00</a:t>
+              <a:t>22-Apr-2015 20:18</a:t>
             </a:fld>
             <a:endParaRPr lang="en-US"/>
           </a:p>

</xml_diff>